<commit_message>
removed reference to reactivity example
</commit_message>
<xml_diff>
--- a/presentation/Not So Shiny - Presentation for R meetup.pptx
+++ b/presentation/Not So Shiny - Presentation for R meetup.pptx
@@ -10045,13 +10045,13 @@
           <a:p>
             <a:r>
               <a:rPr lang="en-US" dirty="0"/>
-              <a:t>However, doing so, I lacked an in-depth understanding of what is reactivity and how it works.</a:t>
+              <a:t>However, doing so, I lacked an in-depth understanding of what is reactivity and how to leverage it.</a:t>
             </a:r>
           </a:p>
           <a:p>
             <a:r>
               <a:rPr lang="en-US" dirty="0"/>
-              <a:t>For example, what is the difference between:</a:t>
+              <a:t>For example, can you answer what is the difference between:</a:t>
             </a:r>
           </a:p>
           <a:p>
@@ -10187,60 +10187,6 @@
               <a:t>6</a:t>
             </a:fld>
             <a:endParaRPr lang="en-US" dirty="0"/>
-          </a:p>
-        </p:txBody>
-      </p:sp>
-      <p:sp>
-        <p:nvSpPr>
-          <p:cNvPr id="8" name="Rectangle 7">
-            <a:extLst>
-              <a:ext uri="{FF2B5EF4-FFF2-40B4-BE49-F238E27FC236}">
-                <a16:creationId xmlns:a16="http://schemas.microsoft.com/office/drawing/2014/main" id="{F297B11D-038A-4A11-A94F-9F194626103F}"/>
-              </a:ext>
-            </a:extLst>
-          </p:cNvPr>
-          <p:cNvSpPr/>
-          <p:nvPr/>
-        </p:nvSpPr>
-        <p:spPr>
-          <a:xfrm rot="20406051">
-            <a:off x="8543345" y="5710520"/>
-            <a:ext cx="3584581" cy="405835"/>
-          </a:xfrm>
-          <a:prstGeom prst="rect">
-            <a:avLst/>
-          </a:prstGeom>
-        </p:spPr>
-        <p:style>
-          <a:lnRef idx="2">
-            <a:schemeClr val="accent1">
-              <a:shade val="50000"/>
-            </a:schemeClr>
-          </a:lnRef>
-          <a:fillRef idx="1">
-            <a:schemeClr val="accent1"/>
-          </a:fillRef>
-          <a:effectRef idx="0">
-            <a:schemeClr val="accent1"/>
-          </a:effectRef>
-          <a:fontRef idx="minor">
-            <a:schemeClr val="lt1"/>
-          </a:fontRef>
-        </p:style>
-        <p:txBody>
-          <a:bodyPr rtlCol="0" anchor="ctr"/>
-          <a:lstStyle/>
-          <a:p>
-            <a:pPr algn="ctr"/>
-            <a:r>
-              <a:rPr lang="en-US" dirty="0"/>
-              <a:t>code/reactivity tricks/</a:t>
-            </a:r>
-            <a:r>
-              <a:rPr lang="en-US" dirty="0" err="1"/>
-              <a:t>app.R</a:t>
-            </a:r>
-            <a:endParaRPr lang="en-IL" dirty="0"/>
           </a:p>
         </p:txBody>
       </p:sp>
@@ -10441,7 +10387,7 @@
         <p:spPr>
           <a:xfrm>
             <a:off x="1168604" y="288285"/>
-            <a:ext cx="4424609" cy="646331"/>
+            <a:ext cx="7896714" cy="646331"/>
           </a:xfrm>
           <a:prstGeom prst="rect">
             <a:avLst/>
@@ -10456,7 +10402,17 @@
           <a:p>
             <a:r>
               <a:rPr lang="en-US" dirty="0"/>
-              <a:t>From mastering-shiny.org </a:t>
+              <a:t>From </a:t>
+            </a:r>
+            <a:r>
+              <a:rPr lang="en-US" dirty="0">
+                <a:hlinkClick r:id="rId4" action="ppaction://hlinkfile"/>
+              </a:rPr>
+              <a:t>mastering-shiny.org</a:t>
+            </a:r>
+            <a:r>
+              <a:rPr lang="en-US" dirty="0"/>
+              <a:t> </a:t>
             </a:r>
             <a:r>
               <a:rPr lang="he-IL" dirty="0"/>
@@ -10474,7 +10430,7 @@
           <a:p>
             <a:r>
               <a:rPr lang="en-US" dirty="0"/>
-              <a:t>(and also, chapters 13-16)</a:t>
+              <a:t>(and in the reactivity context chapters 13-16 are also recommended)</a:t>
             </a:r>
             <a:endParaRPr lang="en-IL" dirty="0"/>
           </a:p>
@@ -10573,7 +10529,7 @@
           <a:p>
             <a:r>
               <a:rPr lang="en-US" sz="2000" dirty="0"/>
-              <a:t>As you grow, your projects get more complex and (hopefully) someone is paying you for them</a:t>
+              <a:t>As you grow, your projects get more complex, someone is paying you for them, you have more users, and you need to maintain a proper service level</a:t>
             </a:r>
           </a:p>
           <a:p>
@@ -10587,7 +10543,7 @@
             </a:r>
             <a:r>
               <a:rPr lang="en-US" sz="2000" dirty="0"/>
-              <a:t>(and not just as the data scientist you are).</a:t>
+              <a:t>(and not just as the data scientist you are)</a:t>
             </a:r>
           </a:p>
           <a:p>
@@ -10659,11 +10615,19 @@
             </a:r>
             <a:r>
               <a:rPr lang="en-US" sz="1800" b="1" dirty="0"/>
-              <a:t>planning budget</a:t>
+              <a:t>planning your resources and budget</a:t>
             </a:r>
             <a:r>
               <a:rPr lang="en-US" sz="1800" dirty="0"/>
-              <a:t>? (e.g., for AWS resources)</a:t>
+              <a:t>? (e.g., for AWS/Azure/</a:t>
+            </a:r>
+            <a:r>
+              <a:rPr lang="en-US" sz="1800" dirty="0" err="1"/>
+              <a:t>gcp</a:t>
+            </a:r>
+            <a:r>
+              <a:rPr lang="en-US" sz="1800" dirty="0"/>
+              <a:t>)</a:t>
             </a:r>
           </a:p>
           <a:p>

</xml_diff>

<commit_message>
updated reference to app code in module slide
</commit_message>
<xml_diff>
--- a/presentation/Not So Shiny - Presentation for R meetup.pptx
+++ b/presentation/Not So Shiny - Presentation for R meetup.pptx
@@ -11384,12 +11384,12 @@
           <a:p>
             <a:pPr algn="ctr"/>
             <a:r>
+              <a:rPr lang="en-US"/>
+              <a:t>see code</a:t>
+            </a:r>
+            <a:r>
               <a:rPr lang="en-US" dirty="0"/>
-              <a:t>code/modules/</a:t>
-            </a:r>
-            <a:r>
-              <a:rPr lang="en-US" dirty="0" err="1"/>
-              <a:t>app.R</a:t>
+              <a:t>/modules/</a:t>
             </a:r>
             <a:endParaRPr lang="en-IL" dirty="0"/>
           </a:p>

</xml_diff>